<commit_message>
Teste de estrelinha da avaliação
</commit_message>
<xml_diff>
--- a/lancerJob/Arquivos do Projeto/Logo.pptx
+++ b/lancerJob/Arquivos do Projeto/Logo.pptx
@@ -6,6 +6,7 @@
   </p:sldMasterIdLst>
   <p:sldIdLst>
     <p:sldId id="256" r:id="rId2"/>
+    <p:sldId id="257" r:id="rId3"/>
   </p:sldIdLst>
   <p:sldSz cx="9144000" cy="6858000" type="screen4x3"/>
   <p:notesSz cx="6858000" cy="9144000"/>
@@ -104,6 +105,22 @@
       </a:defRPr>
     </a:lvl9pPr>
   </p:defaultTextStyle>
+  <p:extLst>
+    <p:ext uri="{EFAFB233-063F-42B5-8137-9DF3F51BA10A}">
+      <p15:sldGuideLst xmlns:p15="http://schemas.microsoft.com/office/powerpoint/2012/main">
+        <p15:guide id="1" orient="horz" pos="2160">
+          <p15:clr>
+            <a:srgbClr val="A4A3A4"/>
+          </p15:clr>
+        </p15:guide>
+        <p15:guide id="2" pos="2880">
+          <p15:clr>
+            <a:srgbClr val="A4A3A4"/>
+          </p15:clr>
+        </p15:guide>
+      </p15:sldGuideLst>
+    </p:ext>
+  </p:extLst>
 </p:presentation>
 </file>
 
@@ -288,7 +305,7 @@
           <a:p>
             <a:fld id="{C9C52812-8A7F-42E9-A0B2-F2D4E8D060A1}" type="datetimeFigureOut">
               <a:rPr lang="pt-BR" smtClean="0"/>
-              <a:t>24/05/2016</a:t>
+              <a:t>26/05/2016</a:t>
             </a:fld>
             <a:endParaRPr lang="pt-BR"/>
           </a:p>
@@ -330,7 +347,7 @@
           <a:p>
             <a:fld id="{4ED98E5F-C124-4A1F-AA46-7EC63AF80DF1}" type="slidenum">
               <a:rPr lang="pt-BR" smtClean="0"/>
-              <a:t>‹nº›</a:t>
+              <a:t>‹#›</a:t>
             </a:fld>
             <a:endParaRPr lang="pt-BR"/>
           </a:p>
@@ -458,7 +475,7 @@
           <a:p>
             <a:fld id="{C9C52812-8A7F-42E9-A0B2-F2D4E8D060A1}" type="datetimeFigureOut">
               <a:rPr lang="pt-BR" smtClean="0"/>
-              <a:t>24/05/2016</a:t>
+              <a:t>26/05/2016</a:t>
             </a:fld>
             <a:endParaRPr lang="pt-BR"/>
           </a:p>
@@ -500,7 +517,7 @@
           <a:p>
             <a:fld id="{4ED98E5F-C124-4A1F-AA46-7EC63AF80DF1}" type="slidenum">
               <a:rPr lang="pt-BR" smtClean="0"/>
-              <a:t>‹nº›</a:t>
+              <a:t>‹#›</a:t>
             </a:fld>
             <a:endParaRPr lang="pt-BR"/>
           </a:p>
@@ -638,7 +655,7 @@
           <a:p>
             <a:fld id="{C9C52812-8A7F-42E9-A0B2-F2D4E8D060A1}" type="datetimeFigureOut">
               <a:rPr lang="pt-BR" smtClean="0"/>
-              <a:t>24/05/2016</a:t>
+              <a:t>26/05/2016</a:t>
             </a:fld>
             <a:endParaRPr lang="pt-BR"/>
           </a:p>
@@ -680,7 +697,7 @@
           <a:p>
             <a:fld id="{4ED98E5F-C124-4A1F-AA46-7EC63AF80DF1}" type="slidenum">
               <a:rPr lang="pt-BR" smtClean="0"/>
-              <a:t>‹nº›</a:t>
+              <a:t>‹#›</a:t>
             </a:fld>
             <a:endParaRPr lang="pt-BR"/>
           </a:p>
@@ -808,7 +825,7 @@
           <a:p>
             <a:fld id="{C9C52812-8A7F-42E9-A0B2-F2D4E8D060A1}" type="datetimeFigureOut">
               <a:rPr lang="pt-BR" smtClean="0"/>
-              <a:t>24/05/2016</a:t>
+              <a:t>26/05/2016</a:t>
             </a:fld>
             <a:endParaRPr lang="pt-BR"/>
           </a:p>
@@ -850,7 +867,7 @@
           <a:p>
             <a:fld id="{4ED98E5F-C124-4A1F-AA46-7EC63AF80DF1}" type="slidenum">
               <a:rPr lang="pt-BR" smtClean="0"/>
-              <a:t>‹nº›</a:t>
+              <a:t>‹#›</a:t>
             </a:fld>
             <a:endParaRPr lang="pt-BR"/>
           </a:p>
@@ -1054,7 +1071,7 @@
           <a:p>
             <a:fld id="{C9C52812-8A7F-42E9-A0B2-F2D4E8D060A1}" type="datetimeFigureOut">
               <a:rPr lang="pt-BR" smtClean="0"/>
-              <a:t>24/05/2016</a:t>
+              <a:t>26/05/2016</a:t>
             </a:fld>
             <a:endParaRPr lang="pt-BR"/>
           </a:p>
@@ -1096,7 +1113,7 @@
           <a:p>
             <a:fld id="{4ED98E5F-C124-4A1F-AA46-7EC63AF80DF1}" type="slidenum">
               <a:rPr lang="pt-BR" smtClean="0"/>
-              <a:t>‹nº›</a:t>
+              <a:t>‹#›</a:t>
             </a:fld>
             <a:endParaRPr lang="pt-BR"/>
           </a:p>
@@ -1342,7 +1359,7 @@
           <a:p>
             <a:fld id="{C9C52812-8A7F-42E9-A0B2-F2D4E8D060A1}" type="datetimeFigureOut">
               <a:rPr lang="pt-BR" smtClean="0"/>
-              <a:t>24/05/2016</a:t>
+              <a:t>26/05/2016</a:t>
             </a:fld>
             <a:endParaRPr lang="pt-BR"/>
           </a:p>
@@ -1384,7 +1401,7 @@
           <a:p>
             <a:fld id="{4ED98E5F-C124-4A1F-AA46-7EC63AF80DF1}" type="slidenum">
               <a:rPr lang="pt-BR" smtClean="0"/>
-              <a:t>‹nº›</a:t>
+              <a:t>‹#›</a:t>
             </a:fld>
             <a:endParaRPr lang="pt-BR"/>
           </a:p>
@@ -1764,7 +1781,7 @@
           <a:p>
             <a:fld id="{C9C52812-8A7F-42E9-A0B2-F2D4E8D060A1}" type="datetimeFigureOut">
               <a:rPr lang="pt-BR" smtClean="0"/>
-              <a:t>24/05/2016</a:t>
+              <a:t>26/05/2016</a:t>
             </a:fld>
             <a:endParaRPr lang="pt-BR"/>
           </a:p>
@@ -1806,7 +1823,7 @@
           <a:p>
             <a:fld id="{4ED98E5F-C124-4A1F-AA46-7EC63AF80DF1}" type="slidenum">
               <a:rPr lang="pt-BR" smtClean="0"/>
-              <a:t>‹nº›</a:t>
+              <a:t>‹#›</a:t>
             </a:fld>
             <a:endParaRPr lang="pt-BR"/>
           </a:p>
@@ -1882,7 +1899,7 @@
           <a:p>
             <a:fld id="{C9C52812-8A7F-42E9-A0B2-F2D4E8D060A1}" type="datetimeFigureOut">
               <a:rPr lang="pt-BR" smtClean="0"/>
-              <a:t>24/05/2016</a:t>
+              <a:t>26/05/2016</a:t>
             </a:fld>
             <a:endParaRPr lang="pt-BR"/>
           </a:p>
@@ -1924,7 +1941,7 @@
           <a:p>
             <a:fld id="{4ED98E5F-C124-4A1F-AA46-7EC63AF80DF1}" type="slidenum">
               <a:rPr lang="pt-BR" smtClean="0"/>
-              <a:t>‹nº›</a:t>
+              <a:t>‹#›</a:t>
             </a:fld>
             <a:endParaRPr lang="pt-BR"/>
           </a:p>
@@ -1977,7 +1994,7 @@
           <a:p>
             <a:fld id="{C9C52812-8A7F-42E9-A0B2-F2D4E8D060A1}" type="datetimeFigureOut">
               <a:rPr lang="pt-BR" smtClean="0"/>
-              <a:t>24/05/2016</a:t>
+              <a:t>26/05/2016</a:t>
             </a:fld>
             <a:endParaRPr lang="pt-BR"/>
           </a:p>
@@ -2019,7 +2036,7 @@
           <a:p>
             <a:fld id="{4ED98E5F-C124-4A1F-AA46-7EC63AF80DF1}" type="slidenum">
               <a:rPr lang="pt-BR" smtClean="0"/>
-              <a:t>‹nº›</a:t>
+              <a:t>‹#›</a:t>
             </a:fld>
             <a:endParaRPr lang="pt-BR"/>
           </a:p>
@@ -2254,7 +2271,7 @@
           <a:p>
             <a:fld id="{C9C52812-8A7F-42E9-A0B2-F2D4E8D060A1}" type="datetimeFigureOut">
               <a:rPr lang="pt-BR" smtClean="0"/>
-              <a:t>24/05/2016</a:t>
+              <a:t>26/05/2016</a:t>
             </a:fld>
             <a:endParaRPr lang="pt-BR"/>
           </a:p>
@@ -2296,7 +2313,7 @@
           <a:p>
             <a:fld id="{4ED98E5F-C124-4A1F-AA46-7EC63AF80DF1}" type="slidenum">
               <a:rPr lang="pt-BR" smtClean="0"/>
-              <a:t>‹nº›</a:t>
+              <a:t>‹#›</a:t>
             </a:fld>
             <a:endParaRPr lang="pt-BR"/>
           </a:p>
@@ -2507,7 +2524,7 @@
           <a:p>
             <a:fld id="{C9C52812-8A7F-42E9-A0B2-F2D4E8D060A1}" type="datetimeFigureOut">
               <a:rPr lang="pt-BR" smtClean="0"/>
-              <a:t>24/05/2016</a:t>
+              <a:t>26/05/2016</a:t>
             </a:fld>
             <a:endParaRPr lang="pt-BR"/>
           </a:p>
@@ -2549,7 +2566,7 @@
           <a:p>
             <a:fld id="{4ED98E5F-C124-4A1F-AA46-7EC63AF80DF1}" type="slidenum">
               <a:rPr lang="pt-BR" smtClean="0"/>
-              <a:t>‹nº›</a:t>
+              <a:t>‹#›</a:t>
             </a:fld>
             <a:endParaRPr lang="pt-BR"/>
           </a:p>
@@ -2720,7 +2737,7 @@
           <a:p>
             <a:fld id="{C9C52812-8A7F-42E9-A0B2-F2D4E8D060A1}" type="datetimeFigureOut">
               <a:rPr lang="pt-BR" smtClean="0"/>
-              <a:t>24/05/2016</a:t>
+              <a:t>26/05/2016</a:t>
             </a:fld>
             <a:endParaRPr lang="pt-BR"/>
           </a:p>
@@ -2798,7 +2815,7 @@
           <a:p>
             <a:fld id="{4ED98E5F-C124-4A1F-AA46-7EC63AF80DF1}" type="slidenum">
               <a:rPr lang="pt-BR" smtClean="0"/>
-              <a:t>‹nº›</a:t>
+              <a:t>‹#›</a:t>
             </a:fld>
             <a:endParaRPr lang="pt-BR"/>
           </a:p>
@@ -3334,6 +3351,155 @@
 </p:sld>
 </file>
 
+<file path=ppt/slides/slide2.xml><?xml version="1.0" encoding="utf-8"?>
+<p:sld xmlns:a="http://schemas.openxmlformats.org/drawingml/2006/main" xmlns:r="http://schemas.openxmlformats.org/officeDocument/2006/relationships" xmlns:p="http://schemas.openxmlformats.org/presentationml/2006/main">
+  <p:cSld>
+    <p:spTree>
+      <p:nvGrpSpPr>
+        <p:cNvPr id="1" name=""/>
+        <p:cNvGrpSpPr/>
+        <p:nvPr/>
+      </p:nvGrpSpPr>
+      <p:grpSpPr>
+        <a:xfrm>
+          <a:off x="0" y="0"/>
+          <a:ext cx="0" cy="0"/>
+          <a:chOff x="0" y="0"/>
+          <a:chExt cx="0" cy="0"/>
+        </a:xfrm>
+      </p:grpSpPr>
+      <p:grpSp>
+        <p:nvGrpSpPr>
+          <p:cNvPr id="2" name="Group 1"/>
+          <p:cNvGrpSpPr/>
+          <p:nvPr/>
+        </p:nvGrpSpPr>
+        <p:grpSpPr>
+          <a:xfrm>
+            <a:off x="251520" y="1268760"/>
+            <a:ext cx="15503985" cy="3384376"/>
+            <a:chOff x="251520" y="1268760"/>
+            <a:chExt cx="15503985" cy="3384376"/>
+          </a:xfrm>
+        </p:grpSpPr>
+        <p:pic>
+          <p:nvPicPr>
+            <p:cNvPr id="5" name="Picture 5" descr="https://image.freepik.com/free-vector/technology-devices-network-vector_23-2147492099.jpg"/>
+            <p:cNvPicPr>
+              <a:picLocks noChangeAspect="1" noChangeArrowheads="1"/>
+            </p:cNvPicPr>
+            <p:nvPr/>
+          </p:nvPicPr>
+          <p:blipFill rotWithShape="1">
+            <a:blip r:embed="rId2">
+              <a:clrChange>
+                <a:clrFrom>
+                  <a:srgbClr val="D8E7E2"/>
+                </a:clrFrom>
+                <a:clrTo>
+                  <a:srgbClr val="D8E7E2">
+                    <a:alpha val="0"/>
+                  </a:srgbClr>
+                </a:clrTo>
+              </a:clrChange>
+              <a:extLst>
+                <a:ext uri="{28A0092B-C50C-407E-A947-70E740481C1C}">
+                  <a14:useLocalDpi xmlns:a14="http://schemas.microsoft.com/office/drawing/2010/main" val="0"/>
+                </a:ext>
+              </a:extLst>
+            </a:blip>
+            <a:srcRect b="7904"/>
+            <a:stretch/>
+          </p:blipFill>
+          <p:spPr bwMode="auto">
+            <a:xfrm>
+              <a:off x="251520" y="1268760"/>
+              <a:ext cx="3674832" cy="3384376"/>
+            </a:xfrm>
+            <a:prstGeom prst="rect">
+              <a:avLst/>
+            </a:prstGeom>
+            <a:noFill/>
+            <a:extLst>
+              <a:ext uri="{909E8E84-426E-40DD-AFC4-6F175D3DCCD1}">
+                <a14:hiddenFill xmlns:a14="http://schemas.microsoft.com/office/drawing/2010/main">
+                  <a:solidFill>
+                    <a:srgbClr val="FFFFFF"/>
+                  </a:solidFill>
+                </a14:hiddenFill>
+              </a:ext>
+            </a:extLst>
+          </p:spPr>
+        </p:pic>
+        <p:sp>
+          <p:nvSpPr>
+            <p:cNvPr id="6" name="CaixaDeTexto 4"/>
+            <p:cNvSpPr txBox="1"/>
+            <p:nvPr/>
+          </p:nvSpPr>
+          <p:spPr>
+            <a:xfrm>
+              <a:off x="4211960" y="2252479"/>
+              <a:ext cx="11543545" cy="2400657"/>
+            </a:xfrm>
+            <a:prstGeom prst="rect">
+              <a:avLst/>
+            </a:prstGeom>
+            <a:noFill/>
+          </p:spPr>
+          <p:txBody>
+            <a:bodyPr wrap="none" rtlCol="0">
+              <a:spAutoFit/>
+            </a:bodyPr>
+            <a:lstStyle/>
+            <a:p>
+              <a:pPr algn="ctr"/>
+              <a:r>
+                <a:rPr lang="pt-BR" sz="15000" dirty="0" smtClean="0">
+                  <a:solidFill>
+                    <a:srgbClr val="292929"/>
+                  </a:solidFill>
+                  <a:effectLst>
+                    <a:outerShdw blurRad="38100" dist="38100" dir="2700000" algn="tl">
+                      <a:srgbClr val="000000">
+                        <a:alpha val="43137"/>
+                      </a:srgbClr>
+                    </a:outerShdw>
+                  </a:effectLst>
+                  <a:latin typeface="Poor Richard" panose="02080502050505020702" pitchFamily="18" charset="0"/>
+                </a:rPr>
+                <a:t>LancerJobs.com</a:t>
+              </a:r>
+              <a:endParaRPr lang="pt-BR" sz="15000" dirty="0">
+                <a:solidFill>
+                  <a:srgbClr val="292929"/>
+                </a:solidFill>
+                <a:effectLst>
+                  <a:outerShdw blurRad="38100" dist="38100" dir="2700000" algn="tl">
+                    <a:srgbClr val="000000">
+                      <a:alpha val="43137"/>
+                    </a:srgbClr>
+                  </a:outerShdw>
+                </a:effectLst>
+                <a:latin typeface="Poor Richard" panose="02080502050505020702" pitchFamily="18" charset="0"/>
+              </a:endParaRPr>
+            </a:p>
+          </p:txBody>
+        </p:sp>
+      </p:grpSp>
+    </p:spTree>
+    <p:extLst>
+      <p:ext uri="{BB962C8B-B14F-4D97-AF65-F5344CB8AC3E}">
+        <p14:creationId xmlns:p14="http://schemas.microsoft.com/office/powerpoint/2010/main" val="103789814"/>
+      </p:ext>
+    </p:extLst>
+  </p:cSld>
+  <p:clrMapOvr>
+    <a:masterClrMapping/>
+  </p:clrMapOvr>
+</p:sld>
+</file>
+
 <file path=ppt/theme/theme1.xml><?xml version="1.0" encoding="utf-8"?>
 <a:theme xmlns:a="http://schemas.openxmlformats.org/drawingml/2006/main" name="Tema do Office">
   <a:themeElements>

</xml_diff>